<commit_message>
update 월간 세미나 모두를 위한 ML - fix typo
</commit_message>
<xml_diff>
--- a/Article/Note/월간_세미나_모두를_위한_ML/img/img.pptx
+++ b/Article/Note/월간_세미나_모두를_위한_ML/img/img.pptx
@@ -107,6 +107,22 @@
       </a:defRPr>
     </a:lvl9pPr>
   </p:defaultTextStyle>
+  <p:extLst>
+    <p:ext uri="{EFAFB233-063F-42B5-8137-9DF3F51BA10A}">
+      <p15:sldGuideLst xmlns:p15="http://schemas.microsoft.com/office/powerpoint/2012/main">
+        <p15:guide id="1" orient="horz" pos="2160" userDrawn="1">
+          <p15:clr>
+            <a:srgbClr val="A4A3A4"/>
+          </p15:clr>
+        </p15:guide>
+        <p15:guide id="2" pos="3840" userDrawn="1">
+          <p15:clr>
+            <a:srgbClr val="A4A3A4"/>
+          </p15:clr>
+        </p15:guide>
+      </p15:sldGuideLst>
+    </p:ext>
+  </p:extLst>
 </p:presentation>
 </file>
 
@@ -3391,7 +3407,7 @@
         </p:blipFill>
         <p:spPr>
           <a:xfrm>
-            <a:off x="803137" y="1270378"/>
+            <a:off x="955537" y="1270378"/>
             <a:ext cx="5292863" cy="5587622"/>
           </a:xfrm>
           <a:prstGeom prst="rect">
@@ -3413,8 +3429,8 @@
         </p:nvSpPr>
         <p:spPr>
           <a:xfrm>
-            <a:off x="5018993" y="2074783"/>
-            <a:ext cx="6546932" cy="1354217"/>
+            <a:off x="5943600" y="2074783"/>
+            <a:ext cx="4826802" cy="1354217"/>
           </a:xfrm>
           <a:prstGeom prst="rect">
             <a:avLst/>
@@ -3455,7 +3471,7 @@
                 <a:latin typeface="Noto Sans KR" panose="020B0500000000000000" pitchFamily="34" charset="-128"/>
                 <a:ea typeface="Noto Sans KR" panose="020B0500000000000000" pitchFamily="34" charset="-128"/>
               </a:rPr>
-              <a:t>Data ML Service</a:t>
+              <a:t>Data  ML Service </a:t>
             </a:r>
             <a:r>
               <a:rPr lang="ko-KR" altLang="en-US" sz="2800" b="1" dirty="0">
@@ -3465,7 +3481,7 @@
               <a:t> </a:t>
             </a:r>
             <a:r>
-              <a:rPr lang="en-US" altLang="ko-KR" sz="2800" b="1">
+              <a:rPr lang="en-US" altLang="ko-KR" sz="2800" b="1" dirty="0">
                 <a:latin typeface="Noto Sans KR" panose="020B0500000000000000" pitchFamily="34" charset="-128"/>
                 <a:ea typeface="Noto Sans KR" panose="020B0500000000000000" pitchFamily="34" charset="-128"/>
               </a:rPr>
@@ -3474,6 +3490,85 @@
             <a:endParaRPr kumimoji="1" lang="ko-KR" altLang="en-US" sz="2800" b="1" dirty="0">
               <a:latin typeface="Noto Sans KR" panose="020B0500000000000000" pitchFamily="34" charset="-128"/>
               <a:ea typeface="Noto Sans KR" panose="020B0500000000000000" pitchFamily="34" charset="-128"/>
+            </a:endParaRPr>
+          </a:p>
+        </p:txBody>
+      </p:sp>
+      <p:pic>
+        <p:nvPicPr>
+          <p:cNvPr id="7" name="그림 6">
+            <a:extLst>
+              <a:ext uri="{FF2B5EF4-FFF2-40B4-BE49-F238E27FC236}">
+                <a16:creationId xmlns:a16="http://schemas.microsoft.com/office/drawing/2014/main" id="{C09AF446-4659-4640-945C-D9D5BF631769}"/>
+              </a:ext>
+            </a:extLst>
+          </p:cNvPr>
+          <p:cNvPicPr>
+            <a:picLocks noChangeAspect="1"/>
+          </p:cNvPicPr>
+          <p:nvPr/>
+        </p:nvPicPr>
+        <p:blipFill>
+          <a:blip r:embed="rId3"/>
+          <a:stretch>
+            <a:fillRect/>
+          </a:stretch>
+        </p:blipFill>
+        <p:spPr>
+          <a:xfrm>
+            <a:off x="7651716" y="6307251"/>
+            <a:ext cx="1410569" cy="348767"/>
+          </a:xfrm>
+          <a:prstGeom prst="rect">
+            <a:avLst/>
+          </a:prstGeom>
+        </p:spPr>
+      </p:pic>
+      <p:sp>
+        <p:nvSpPr>
+          <p:cNvPr id="8" name="TextBox 7">
+            <a:extLst>
+              <a:ext uri="{FF2B5EF4-FFF2-40B4-BE49-F238E27FC236}">
+                <a16:creationId xmlns:a16="http://schemas.microsoft.com/office/drawing/2014/main" id="{755CDBC5-FE4B-8240-9C03-4CC0349BD4EF}"/>
+              </a:ext>
+            </a:extLst>
+          </p:cNvPr>
+          <p:cNvSpPr txBox="1"/>
+          <p:nvPr/>
+        </p:nvSpPr>
+        <p:spPr>
+          <a:xfrm>
+            <a:off x="8953057" y="3581400"/>
+            <a:ext cx="1717137" cy="369332"/>
+          </a:xfrm>
+          <a:prstGeom prst="rect">
+            <a:avLst/>
+          </a:prstGeom>
+          <a:noFill/>
+        </p:spPr>
+        <p:txBody>
+          <a:bodyPr wrap="none" rtlCol="0">
+            <a:spAutoFit/>
+          </a:bodyPr>
+          <a:lstStyle/>
+          <a:p>
+            <a:r>
+              <a:rPr kumimoji="1" lang="ko-KR" altLang="en-US" dirty="0">
+                <a:latin typeface="Noto Sans KR Medium" panose="020B0500000000000000" pitchFamily="34" charset="-128"/>
+                <a:ea typeface="Noto Sans KR Medium" panose="020B0500000000000000" pitchFamily="34" charset="-128"/>
+              </a:rPr>
+              <a:t>강연자 </a:t>
+            </a:r>
+            <a:r>
+              <a:rPr kumimoji="1" lang="ko-KR" altLang="en-US" dirty="0" err="1">
+                <a:latin typeface="Noto Sans KR Medium" panose="020B0500000000000000" pitchFamily="34" charset="-128"/>
+                <a:ea typeface="Noto Sans KR Medium" panose="020B0500000000000000" pitchFamily="34" charset="-128"/>
+              </a:rPr>
+              <a:t>박종천님</a:t>
+            </a:r>
+            <a:endParaRPr kumimoji="1" lang="ko-KR" altLang="en-US" dirty="0">
+              <a:latin typeface="Noto Sans KR Medium" panose="020B0500000000000000" pitchFamily="34" charset="-128"/>
+              <a:ea typeface="Noto Sans KR Medium" panose="020B0500000000000000" pitchFamily="34" charset="-128"/>
             </a:endParaRPr>
           </a:p>
         </p:txBody>

</xml_diff>